<commit_message>
[CODE] SUBMITTING LATEST CHANGES
</commit_message>
<xml_diff>
--- a/Doc/PP2-INTRO_NODE_TS/Introducción a TypeScript.pptx
+++ b/Doc/PP2-INTRO_NODE_TS/Introducción a TypeScript.pptx
@@ -5,15 +5,17 @@
     <p:sldMasterId id="2147483666" r:id="rId4"/>
   </p:sldMasterIdLst>
   <p:notesMasterIdLst>
-    <p:notesMasterId r:id="rId8"/>
+    <p:notesMasterId r:id="rId10"/>
   </p:notesMasterIdLst>
   <p:handoutMasterIdLst>
-    <p:handoutMasterId r:id="rId9"/>
+    <p:handoutMasterId r:id="rId11"/>
   </p:handoutMasterIdLst>
   <p:sldIdLst>
     <p:sldId id="314" r:id="rId5"/>
     <p:sldId id="315" r:id="rId6"/>
     <p:sldId id="326" r:id="rId7"/>
+    <p:sldId id="332" r:id="rId8"/>
+    <p:sldId id="331" r:id="rId9"/>
   </p:sldIdLst>
   <p:sldSz cx="12192000" cy="6858000"/>
   <p:notesSz cx="6858000" cy="9144000"/>
@@ -242,7 +244,7 @@
             <a:pPr rtl="0"/>
             <a:fld id="{146CFD56-E74D-46D7-A822-3A365FC491DB}" type="datetime1">
               <a:rPr lang="es-ES" smtClean="0"/>
-              <a:t>16/05/2025</a:t>
+              <a:t>26/05/2025</a:t>
             </a:fld>
             <a:endParaRPr lang="es-ES" dirty="0"/>
           </a:p>
@@ -424,7 +426,7 @@
             <a:pPr rtl="0"/>
             <a:fld id="{1D8ACD52-3BC9-4181-9014-67395FAB9A59}" type="datetime1">
               <a:rPr lang="es-ES" smtClean="0"/>
-              <a:t>16/05/2025</a:t>
+              <a:t>26/05/2025</a:t>
             </a:fld>
             <a:endParaRPr lang="es-ES" dirty="0"/>
           </a:p>
@@ -1000,6 +1002,242 @@
     <p:extLst>
       <p:ext uri="{BB962C8B-B14F-4D97-AF65-F5344CB8AC3E}">
         <p14:creationId xmlns:p14="http://schemas.microsoft.com/office/powerpoint/2010/main" val="3595951434"/>
+      </p:ext>
+    </p:extLst>
+  </p:cSld>
+  <p:clrMapOvr>
+    <a:masterClrMapping/>
+  </p:clrMapOvr>
+</p:notes>
+</file>
+
+<file path=ppt/notesSlides/notesSlide4.xml><?xml version="1.0" encoding="utf-8"?>
+<p:notes xmlns:a="http://schemas.openxmlformats.org/drawingml/2006/main" xmlns:r="http://schemas.openxmlformats.org/officeDocument/2006/relationships" xmlns:p="http://schemas.openxmlformats.org/presentationml/2006/main">
+  <p:cSld>
+    <p:spTree>
+      <p:nvGrpSpPr>
+        <p:cNvPr id="1" name="">
+          <a:extLst>
+            <a:ext uri="{FF2B5EF4-FFF2-40B4-BE49-F238E27FC236}">
+              <a16:creationId xmlns:a16="http://schemas.microsoft.com/office/drawing/2014/main" id="{28518D78-B977-3DFA-5D5F-3E54A928355D}"/>
+            </a:ext>
+          </a:extLst>
+        </p:cNvPr>
+        <p:cNvGrpSpPr/>
+        <p:nvPr/>
+      </p:nvGrpSpPr>
+      <p:grpSpPr>
+        <a:xfrm>
+          <a:off x="0" y="0"/>
+          <a:ext cx="0" cy="0"/>
+          <a:chOff x="0" y="0"/>
+          <a:chExt cx="0" cy="0"/>
+        </a:xfrm>
+      </p:grpSpPr>
+      <p:sp>
+        <p:nvSpPr>
+          <p:cNvPr id="2" name="Marcador de imagen de diapositiva 1">
+            <a:extLst>
+              <a:ext uri="{FF2B5EF4-FFF2-40B4-BE49-F238E27FC236}">
+                <a16:creationId xmlns:a16="http://schemas.microsoft.com/office/drawing/2014/main" id="{22E34558-5956-B4D2-F110-C2869ED772BB}"/>
+              </a:ext>
+            </a:extLst>
+          </p:cNvPr>
+          <p:cNvSpPr>
+            <a:spLocks noGrp="1" noRot="1" noChangeAspect="1"/>
+          </p:cNvSpPr>
+          <p:nvPr>
+            <p:ph type="sldImg"/>
+          </p:nvPr>
+        </p:nvSpPr>
+        <p:spPr/>
+      </p:sp>
+      <p:sp>
+        <p:nvSpPr>
+          <p:cNvPr id="3" name="Marcador de notas 2">
+            <a:extLst>
+              <a:ext uri="{FF2B5EF4-FFF2-40B4-BE49-F238E27FC236}">
+                <a16:creationId xmlns:a16="http://schemas.microsoft.com/office/drawing/2014/main" id="{2665D56B-F470-2104-2074-912CF61A82CC}"/>
+              </a:ext>
+            </a:extLst>
+          </p:cNvPr>
+          <p:cNvSpPr>
+            <a:spLocks noGrp="1"/>
+          </p:cNvSpPr>
+          <p:nvPr>
+            <p:ph type="body" idx="1"/>
+          </p:nvPr>
+        </p:nvSpPr>
+        <p:spPr/>
+        <p:txBody>
+          <a:bodyPr rtlCol="0"/>
+          <a:lstStyle>
+            <a:defPPr>
+              <a:defRPr lang="es-ES"/>
+            </a:defPPr>
+          </a:lstStyle>
+          <a:p>
+            <a:pPr rtl="0"/>
+            <a:endParaRPr lang="es-ES" dirty="0"/>
+          </a:p>
+        </p:txBody>
+      </p:sp>
+      <p:sp>
+        <p:nvSpPr>
+          <p:cNvPr id="4" name="Marcador de número de diapositiva 3">
+            <a:extLst>
+              <a:ext uri="{FF2B5EF4-FFF2-40B4-BE49-F238E27FC236}">
+                <a16:creationId xmlns:a16="http://schemas.microsoft.com/office/drawing/2014/main" id="{16AC5AF5-8307-38E9-A91B-06D712391D16}"/>
+              </a:ext>
+            </a:extLst>
+          </p:cNvPr>
+          <p:cNvSpPr>
+            <a:spLocks noGrp="1"/>
+          </p:cNvSpPr>
+          <p:nvPr>
+            <p:ph type="sldNum" sz="quarter" idx="5"/>
+          </p:nvPr>
+        </p:nvSpPr>
+        <p:spPr/>
+        <p:txBody>
+          <a:bodyPr rtlCol="0"/>
+          <a:lstStyle>
+            <a:defPPr>
+              <a:defRPr lang="es-ES"/>
+            </a:defPPr>
+          </a:lstStyle>
+          <a:p>
+            <a:pPr rtl="0"/>
+            <a:fld id="{D4B9A9E5-4F7F-4A7D-9DE1-899232329269}" type="slidenum">
+              <a:rPr lang="es-ES" smtClean="0"/>
+              <a:t>4</a:t>
+            </a:fld>
+            <a:endParaRPr lang="es-ES" dirty="0"/>
+          </a:p>
+        </p:txBody>
+      </p:sp>
+    </p:spTree>
+    <p:extLst>
+      <p:ext uri="{BB962C8B-B14F-4D97-AF65-F5344CB8AC3E}">
+        <p14:creationId xmlns:p14="http://schemas.microsoft.com/office/powerpoint/2010/main" val="2483195274"/>
+      </p:ext>
+    </p:extLst>
+  </p:cSld>
+  <p:clrMapOvr>
+    <a:masterClrMapping/>
+  </p:clrMapOvr>
+</p:notes>
+</file>
+
+<file path=ppt/notesSlides/notesSlide5.xml><?xml version="1.0" encoding="utf-8"?>
+<p:notes xmlns:a="http://schemas.openxmlformats.org/drawingml/2006/main" xmlns:r="http://schemas.openxmlformats.org/officeDocument/2006/relationships" xmlns:p="http://schemas.openxmlformats.org/presentationml/2006/main">
+  <p:cSld>
+    <p:spTree>
+      <p:nvGrpSpPr>
+        <p:cNvPr id="1" name="">
+          <a:extLst>
+            <a:ext uri="{FF2B5EF4-FFF2-40B4-BE49-F238E27FC236}">
+              <a16:creationId xmlns:a16="http://schemas.microsoft.com/office/drawing/2014/main" id="{DC8FFDE3-551D-E15C-63C2-74A3DD34EB06}"/>
+            </a:ext>
+          </a:extLst>
+        </p:cNvPr>
+        <p:cNvGrpSpPr/>
+        <p:nvPr/>
+      </p:nvGrpSpPr>
+      <p:grpSpPr>
+        <a:xfrm>
+          <a:off x="0" y="0"/>
+          <a:ext cx="0" cy="0"/>
+          <a:chOff x="0" y="0"/>
+          <a:chExt cx="0" cy="0"/>
+        </a:xfrm>
+      </p:grpSpPr>
+      <p:sp>
+        <p:nvSpPr>
+          <p:cNvPr id="2" name="Marcador de imagen de diapositiva 1">
+            <a:extLst>
+              <a:ext uri="{FF2B5EF4-FFF2-40B4-BE49-F238E27FC236}">
+                <a16:creationId xmlns:a16="http://schemas.microsoft.com/office/drawing/2014/main" id="{68FE62C9-0023-0A4F-177E-C1C735664A73}"/>
+              </a:ext>
+            </a:extLst>
+          </p:cNvPr>
+          <p:cNvSpPr>
+            <a:spLocks noGrp="1" noRot="1" noChangeAspect="1"/>
+          </p:cNvSpPr>
+          <p:nvPr>
+            <p:ph type="sldImg"/>
+          </p:nvPr>
+        </p:nvSpPr>
+        <p:spPr/>
+      </p:sp>
+      <p:sp>
+        <p:nvSpPr>
+          <p:cNvPr id="3" name="Marcador de notas 2">
+            <a:extLst>
+              <a:ext uri="{FF2B5EF4-FFF2-40B4-BE49-F238E27FC236}">
+                <a16:creationId xmlns:a16="http://schemas.microsoft.com/office/drawing/2014/main" id="{7F12C349-05BF-3978-9947-F2D56C271E1B}"/>
+              </a:ext>
+            </a:extLst>
+          </p:cNvPr>
+          <p:cNvSpPr>
+            <a:spLocks noGrp="1"/>
+          </p:cNvSpPr>
+          <p:nvPr>
+            <p:ph type="body" idx="1"/>
+          </p:nvPr>
+        </p:nvSpPr>
+        <p:spPr/>
+        <p:txBody>
+          <a:bodyPr rtlCol="0"/>
+          <a:lstStyle>
+            <a:defPPr>
+              <a:defRPr lang="es-ES"/>
+            </a:defPPr>
+          </a:lstStyle>
+          <a:p>
+            <a:pPr rtl="0"/>
+            <a:endParaRPr lang="es-ES" dirty="0"/>
+          </a:p>
+        </p:txBody>
+      </p:sp>
+      <p:sp>
+        <p:nvSpPr>
+          <p:cNvPr id="4" name="Marcador de número de diapositiva 3">
+            <a:extLst>
+              <a:ext uri="{FF2B5EF4-FFF2-40B4-BE49-F238E27FC236}">
+                <a16:creationId xmlns:a16="http://schemas.microsoft.com/office/drawing/2014/main" id="{F8AA8063-F3C1-0B3F-FAA7-954AA3F63A88}"/>
+              </a:ext>
+            </a:extLst>
+          </p:cNvPr>
+          <p:cNvSpPr>
+            <a:spLocks noGrp="1"/>
+          </p:cNvSpPr>
+          <p:nvPr>
+            <p:ph type="sldNum" sz="quarter" idx="5"/>
+          </p:nvPr>
+        </p:nvSpPr>
+        <p:spPr/>
+        <p:txBody>
+          <a:bodyPr rtlCol="0"/>
+          <a:lstStyle>
+            <a:defPPr>
+              <a:defRPr lang="es-ES"/>
+            </a:defPPr>
+          </a:lstStyle>
+          <a:p>
+            <a:pPr rtl="0"/>
+            <a:fld id="{D4B9A9E5-4F7F-4A7D-9DE1-899232329269}" type="slidenum">
+              <a:rPr lang="es-ES" smtClean="0"/>
+              <a:t>5</a:t>
+            </a:fld>
+            <a:endParaRPr lang="es-ES" dirty="0"/>
+          </a:p>
+        </p:txBody>
+      </p:sp>
+    </p:spTree>
+    <p:extLst>
+      <p:ext uri="{BB962C8B-B14F-4D97-AF65-F5344CB8AC3E}">
+        <p14:creationId xmlns:p14="http://schemas.microsoft.com/office/powerpoint/2010/main" val="2966663263"/>
       </p:ext>
     </p:extLst>
   </p:cSld>
@@ -6291,6 +6529,430 @@
     <p:extLst>
       <p:ext uri="{BB962C8B-B14F-4D97-AF65-F5344CB8AC3E}">
         <p14:creationId xmlns:p14="http://schemas.microsoft.com/office/powerpoint/2010/main" val="2083079214"/>
+      </p:ext>
+    </p:extLst>
+  </p:cSld>
+  <p:clrMapOvr>
+    <a:masterClrMapping/>
+  </p:clrMapOvr>
+</p:sld>
+</file>
+
+<file path=ppt/slides/slide4.xml><?xml version="1.0" encoding="utf-8"?>
+<p:sld xmlns:a="http://schemas.openxmlformats.org/drawingml/2006/main" xmlns:r="http://schemas.openxmlformats.org/officeDocument/2006/relationships" xmlns:p="http://schemas.openxmlformats.org/presentationml/2006/main">
+  <p:cSld>
+    <p:spTree>
+      <p:nvGrpSpPr>
+        <p:cNvPr id="1" name="">
+          <a:extLst>
+            <a:ext uri="{FF2B5EF4-FFF2-40B4-BE49-F238E27FC236}">
+              <a16:creationId xmlns:a16="http://schemas.microsoft.com/office/drawing/2014/main" id="{1D48D183-EDA5-A6C6-6D85-9257937846E7}"/>
+            </a:ext>
+          </a:extLst>
+        </p:cNvPr>
+        <p:cNvGrpSpPr/>
+        <p:nvPr/>
+      </p:nvGrpSpPr>
+      <p:grpSpPr>
+        <a:xfrm>
+          <a:off x="0" y="0"/>
+          <a:ext cx="0" cy="0"/>
+          <a:chOff x="0" y="0"/>
+          <a:chExt cx="0" cy="0"/>
+        </a:xfrm>
+      </p:grpSpPr>
+      <p:sp>
+        <p:nvSpPr>
+          <p:cNvPr id="3" name="Título 2">
+            <a:extLst>
+              <a:ext uri="{FF2B5EF4-FFF2-40B4-BE49-F238E27FC236}">
+                <a16:creationId xmlns:a16="http://schemas.microsoft.com/office/drawing/2014/main" id="{0A59D745-034F-9A2C-ED2A-65A4DF54A0DA}"/>
+              </a:ext>
+            </a:extLst>
+          </p:cNvPr>
+          <p:cNvSpPr>
+            <a:spLocks noGrp="1"/>
+          </p:cNvSpPr>
+          <p:nvPr>
+            <p:ph type="title"/>
+          </p:nvPr>
+        </p:nvSpPr>
+        <p:spPr>
+          <a:xfrm>
+            <a:off x="914400" y="315533"/>
+            <a:ext cx="5181600" cy="2376868"/>
+          </a:xfrm>
+        </p:spPr>
+        <p:txBody>
+          <a:bodyPr rtlCol="0"/>
+          <a:lstStyle>
+            <a:defPPr>
+              <a:defRPr lang="es-ES"/>
+            </a:defPPr>
+          </a:lstStyle>
+          <a:p>
+            <a:pPr rtl="0"/>
+            <a:r>
+              <a:rPr lang="es-ES" dirty="0"/>
+              <a:t>¿QUÉ ES Vite?</a:t>
+            </a:r>
+          </a:p>
+        </p:txBody>
+      </p:sp>
+      <p:sp>
+        <p:nvSpPr>
+          <p:cNvPr id="4" name="Marcador de contenido 3">
+            <a:extLst>
+              <a:ext uri="{FF2B5EF4-FFF2-40B4-BE49-F238E27FC236}">
+                <a16:creationId xmlns:a16="http://schemas.microsoft.com/office/drawing/2014/main" id="{2B565DB8-5A85-E470-112A-35FDDCDE0889}"/>
+              </a:ext>
+            </a:extLst>
+          </p:cNvPr>
+          <p:cNvSpPr>
+            <a:spLocks noGrp="1"/>
+          </p:cNvSpPr>
+          <p:nvPr>
+            <p:ph sz="quarter" idx="10"/>
+          </p:nvPr>
+        </p:nvSpPr>
+        <p:spPr>
+          <a:xfrm>
+            <a:off x="914400" y="2844800"/>
+            <a:ext cx="5921406" cy="3128963"/>
+          </a:xfrm>
+        </p:spPr>
+        <p:txBody>
+          <a:bodyPr rtlCol="0"/>
+          <a:lstStyle>
+            <a:defPPr>
+              <a:defRPr lang="es-ES"/>
+            </a:defPPr>
+          </a:lstStyle>
+          <a:p>
+            <a:pPr marL="342900" indent="-342900" rtl="0">
+              <a:buFont typeface="Arial" panose="020B0604020202020204" pitchFamily="34" charset="0"/>
+              <a:buChar char="•"/>
+            </a:pPr>
+            <a:r>
+              <a:rPr lang="es-ES" sz="2400" dirty="0" err="1"/>
+              <a:t>Bundler</a:t>
+            </a:r>
+            <a:endParaRPr lang="es-ES" sz="2400" dirty="0"/>
+          </a:p>
+          <a:p>
+            <a:pPr marL="342900" indent="-342900" rtl="0">
+              <a:buFont typeface="Arial" panose="020B0604020202020204" pitchFamily="34" charset="0"/>
+              <a:buChar char="•"/>
+            </a:pPr>
+            <a:r>
+              <a:rPr lang="es-ES" sz="2400" dirty="0"/>
+              <a:t>HMR (Hot Module </a:t>
+            </a:r>
+            <a:r>
+              <a:rPr lang="es-ES" sz="2400" dirty="0" err="1"/>
+              <a:t>Replacement</a:t>
+            </a:r>
+            <a:r>
+              <a:rPr lang="es-ES" sz="2400" dirty="0"/>
+              <a:t>)</a:t>
+            </a:r>
+          </a:p>
+          <a:p>
+            <a:pPr marL="342900" indent="-342900" rtl="0">
+              <a:buFont typeface="Arial" panose="020B0604020202020204" pitchFamily="34" charset="0"/>
+              <a:buChar char="•"/>
+            </a:pPr>
+            <a:r>
+              <a:rPr lang="es-ES" sz="2400" dirty="0"/>
+              <a:t>Reemplaza </a:t>
+            </a:r>
+            <a:r>
+              <a:rPr lang="es-ES" sz="2400" dirty="0" err="1"/>
+              <a:t>Webpack</a:t>
+            </a:r>
+            <a:r>
+              <a:rPr lang="es-ES" sz="2400" dirty="0"/>
+              <a:t>, </a:t>
+            </a:r>
+            <a:r>
+              <a:rPr lang="es-ES" sz="2400" dirty="0" err="1"/>
+              <a:t>Parcel</a:t>
+            </a:r>
+            <a:endParaRPr lang="es-ES" sz="2400" dirty="0"/>
+          </a:p>
+          <a:p>
+            <a:pPr rtl="0"/>
+            <a:endParaRPr lang="es-ES" dirty="0"/>
+          </a:p>
+        </p:txBody>
+      </p:sp>
+      <p:sp>
+        <p:nvSpPr>
+          <p:cNvPr id="2" name="Marcador de número de diapositiva 1">
+            <a:extLst>
+              <a:ext uri="{FF2B5EF4-FFF2-40B4-BE49-F238E27FC236}">
+                <a16:creationId xmlns:a16="http://schemas.microsoft.com/office/drawing/2014/main" id="{7D53EE2B-5A2A-DA10-3A03-5710FA039E29}"/>
+              </a:ext>
+            </a:extLst>
+          </p:cNvPr>
+          <p:cNvSpPr>
+            <a:spLocks noGrp="1"/>
+          </p:cNvSpPr>
+          <p:nvPr>
+            <p:ph type="sldNum" sz="quarter" idx="4"/>
+          </p:nvPr>
+        </p:nvSpPr>
+        <p:spPr>
+          <a:xfrm>
+            <a:off x="914400" y="6246254"/>
+            <a:ext cx="631065" cy="296214"/>
+          </a:xfrm>
+        </p:spPr>
+        <p:txBody>
+          <a:bodyPr rtlCol="0"/>
+          <a:lstStyle>
+            <a:defPPr>
+              <a:defRPr lang="es-ES"/>
+            </a:defPPr>
+          </a:lstStyle>
+          <a:p>
+            <a:pPr rtl="0"/>
+            <a:fld id="{B5CEABB6-07DC-46E8-9B57-56EC44A396E5}" type="slidenum">
+              <a:rPr lang="es-ES" smtClean="0"/>
+              <a:pPr rtl="0"/>
+              <a:t>4</a:t>
+            </a:fld>
+            <a:endParaRPr lang="es-ES" dirty="0"/>
+          </a:p>
+        </p:txBody>
+      </p:sp>
+      <p:pic>
+        <p:nvPicPr>
+          <p:cNvPr id="1026" name="Picture 2" descr="Vite (software) - Wikipedia">
+            <a:extLst>
+              <a:ext uri="{FF2B5EF4-FFF2-40B4-BE49-F238E27FC236}">
+                <a16:creationId xmlns:a16="http://schemas.microsoft.com/office/drawing/2014/main" id="{775292CE-7DA1-ED93-4FA3-44A56EBE9041}"/>
+              </a:ext>
+            </a:extLst>
+          </p:cNvPr>
+          <p:cNvPicPr>
+            <a:picLocks noChangeAspect="1" noChangeArrowheads="1"/>
+          </p:cNvPicPr>
+          <p:nvPr/>
+        </p:nvPicPr>
+        <p:blipFill>
+          <a:blip r:embed="rId3">
+            <a:extLst>
+              <a:ext uri="{28A0092B-C50C-407E-A947-70E740481C1C}">
+                <a14:useLocalDpi xmlns:a14="http://schemas.microsoft.com/office/drawing/2010/main" val="0"/>
+              </a:ext>
+            </a:extLst>
+          </a:blip>
+          <a:srcRect/>
+          <a:stretch>
+            <a:fillRect/>
+          </a:stretch>
+        </p:blipFill>
+        <p:spPr bwMode="auto">
+          <a:xfrm>
+            <a:off x="4139954" y="1666738"/>
+            <a:ext cx="1399713" cy="1380030"/>
+          </a:xfrm>
+          <a:prstGeom prst="rect">
+            <a:avLst/>
+          </a:prstGeom>
+          <a:noFill/>
+          <a:extLst>
+            <a:ext uri="{909E8E84-426E-40DD-AFC4-6F175D3DCCD1}">
+              <a14:hiddenFill xmlns:a14="http://schemas.microsoft.com/office/drawing/2010/main">
+                <a:solidFill>
+                  <a:srgbClr val="FFFFFF"/>
+                </a:solidFill>
+              </a14:hiddenFill>
+            </a:ext>
+          </a:extLst>
+        </p:spPr>
+      </p:pic>
+    </p:spTree>
+    <p:extLst>
+      <p:ext uri="{BB962C8B-B14F-4D97-AF65-F5344CB8AC3E}">
+        <p14:creationId xmlns:p14="http://schemas.microsoft.com/office/powerpoint/2010/main" val="2187793309"/>
+      </p:ext>
+    </p:extLst>
+  </p:cSld>
+  <p:clrMapOvr>
+    <a:masterClrMapping/>
+  </p:clrMapOvr>
+</p:sld>
+</file>
+
+<file path=ppt/slides/slide5.xml><?xml version="1.0" encoding="utf-8"?>
+<p:sld xmlns:a="http://schemas.openxmlformats.org/drawingml/2006/main" xmlns:r="http://schemas.openxmlformats.org/officeDocument/2006/relationships" xmlns:p="http://schemas.openxmlformats.org/presentationml/2006/main">
+  <p:cSld>
+    <p:spTree>
+      <p:nvGrpSpPr>
+        <p:cNvPr id="1" name="">
+          <a:extLst>
+            <a:ext uri="{FF2B5EF4-FFF2-40B4-BE49-F238E27FC236}">
+              <a16:creationId xmlns:a16="http://schemas.microsoft.com/office/drawing/2014/main" id="{37D21059-321F-618A-E3C5-424894D69E5A}"/>
+            </a:ext>
+          </a:extLst>
+        </p:cNvPr>
+        <p:cNvGrpSpPr/>
+        <p:nvPr/>
+      </p:nvGrpSpPr>
+      <p:grpSpPr>
+        <a:xfrm>
+          <a:off x="0" y="0"/>
+          <a:ext cx="0" cy="0"/>
+          <a:chOff x="0" y="0"/>
+          <a:chExt cx="0" cy="0"/>
+        </a:xfrm>
+      </p:grpSpPr>
+      <p:sp>
+        <p:nvSpPr>
+          <p:cNvPr id="2" name="Título 1">
+            <a:extLst>
+              <a:ext uri="{FF2B5EF4-FFF2-40B4-BE49-F238E27FC236}">
+                <a16:creationId xmlns:a16="http://schemas.microsoft.com/office/drawing/2014/main" id="{2FE2FFE7-D73F-CBEA-89CE-3BD921FA788F}"/>
+              </a:ext>
+            </a:extLst>
+          </p:cNvPr>
+          <p:cNvSpPr>
+            <a:spLocks noGrp="1"/>
+          </p:cNvSpPr>
+          <p:nvPr>
+            <p:ph type="title"/>
+          </p:nvPr>
+        </p:nvSpPr>
+        <p:spPr>
+          <a:xfrm>
+            <a:off x="891990" y="434225"/>
+            <a:ext cx="9524998" cy="1499627"/>
+          </a:xfrm>
+        </p:spPr>
+        <p:txBody>
+          <a:bodyPr rtlCol="0"/>
+          <a:lstStyle>
+            <a:defPPr>
+              <a:defRPr lang="es-ES"/>
+            </a:defPPr>
+          </a:lstStyle>
+          <a:p>
+            <a:pPr rtl="0"/>
+            <a:r>
+              <a:rPr lang="es-ES" dirty="0"/>
+              <a:t>Conceptos de </a:t>
+            </a:r>
+            <a:r>
+              <a:rPr lang="es-ES" dirty="0" err="1"/>
+              <a:t>Typescript</a:t>
+            </a:r>
+            <a:endParaRPr lang="es-ES" dirty="0"/>
+          </a:p>
+        </p:txBody>
+      </p:sp>
+      <p:sp>
+        <p:nvSpPr>
+          <p:cNvPr id="4" name="Marcador de contenido 3">
+            <a:extLst>
+              <a:ext uri="{FF2B5EF4-FFF2-40B4-BE49-F238E27FC236}">
+                <a16:creationId xmlns:a16="http://schemas.microsoft.com/office/drawing/2014/main" id="{DA2821BA-6FF8-70E4-A305-77345CAB1231}"/>
+              </a:ext>
+            </a:extLst>
+          </p:cNvPr>
+          <p:cNvSpPr>
+            <a:spLocks noGrp="1"/>
+          </p:cNvSpPr>
+          <p:nvPr>
+            <p:ph sz="quarter" idx="11"/>
+          </p:nvPr>
+        </p:nvSpPr>
+        <p:spPr>
+          <a:xfrm>
+            <a:off x="1090424" y="1713319"/>
+            <a:ext cx="9053701" cy="3931919"/>
+          </a:xfrm>
+        </p:spPr>
+        <p:txBody>
+          <a:bodyPr rtlCol="0"/>
+          <a:lstStyle>
+            <a:defPPr>
+              <a:defRPr lang="es-ES"/>
+            </a:defPPr>
+          </a:lstStyle>
+          <a:p>
+            <a:pPr rtl="0"/>
+            <a:r>
+              <a:rPr lang="es-ES" dirty="0"/>
+              <a:t>Interfaces</a:t>
+            </a:r>
+          </a:p>
+          <a:p>
+            <a:pPr rtl="0"/>
+            <a:r>
+              <a:rPr lang="es-ES" dirty="0"/>
+              <a:t>Patrones de diseño</a:t>
+            </a:r>
+          </a:p>
+          <a:p>
+            <a:pPr rtl="0"/>
+            <a:r>
+              <a:rPr lang="es-ES" dirty="0"/>
+              <a:t>Desestructuración de objetos </a:t>
+            </a:r>
+            <a:r>
+              <a:rPr lang="es-ES"/>
+              <a:t>y Arreglos</a:t>
+            </a:r>
+            <a:endParaRPr lang="es-ES" dirty="0"/>
+          </a:p>
+        </p:txBody>
+      </p:sp>
+      <p:sp>
+        <p:nvSpPr>
+          <p:cNvPr id="5" name="Marcador de número de diapositiva 4">
+            <a:extLst>
+              <a:ext uri="{FF2B5EF4-FFF2-40B4-BE49-F238E27FC236}">
+                <a16:creationId xmlns:a16="http://schemas.microsoft.com/office/drawing/2014/main" id="{AF1D0654-132B-015F-8A8C-44AFC346D1E4}"/>
+              </a:ext>
+            </a:extLst>
+          </p:cNvPr>
+          <p:cNvSpPr>
+            <a:spLocks noGrp="1"/>
+          </p:cNvSpPr>
+          <p:nvPr>
+            <p:ph type="sldNum" sz="quarter" idx="4"/>
+          </p:nvPr>
+        </p:nvSpPr>
+        <p:spPr>
+          <a:xfrm>
+            <a:off x="914400" y="6246254"/>
+            <a:ext cx="631065" cy="296214"/>
+          </a:xfrm>
+        </p:spPr>
+        <p:txBody>
+          <a:bodyPr rtlCol="0"/>
+          <a:lstStyle>
+            <a:defPPr>
+              <a:defRPr lang="es-ES"/>
+            </a:defPPr>
+          </a:lstStyle>
+          <a:p>
+            <a:pPr rtl="0"/>
+            <a:fld id="{B5CEABB6-07DC-46E8-9B57-56EC44A396E5}" type="slidenum">
+              <a:rPr lang="es-ES" smtClean="0"/>
+              <a:pPr rtl="0"/>
+              <a:t>5</a:t>
+            </a:fld>
+            <a:endParaRPr lang="es-ES" dirty="0"/>
+          </a:p>
+        </p:txBody>
+      </p:sp>
+    </p:spTree>
+    <p:extLst>
+      <p:ext uri="{BB962C8B-B14F-4D97-AF65-F5344CB8AC3E}">
+        <p14:creationId xmlns:p14="http://schemas.microsoft.com/office/powerpoint/2010/main" val="1661664976"/>
       </p:ext>
     </p:extLst>
   </p:cSld>
@@ -7092,6 +7754,35 @@
 </file>
 
 <file path=customXml/item1.xml><?xml version="1.0" encoding="utf-8"?>
+<?mso-contentType ?>
+<FormTemplates xmlns="http://schemas.microsoft.com/sharepoint/v3/contenttype/forms">
+  <Display>DocumentLibraryForm</Display>
+  <Edit>DocumentLibraryForm</Edit>
+  <New>DocumentLibraryForm</New>
+</FormTemplates>
+</file>
+
+<file path=customXml/item2.xml><?xml version="1.0" encoding="utf-8"?>
+<p:properties xmlns:p="http://schemas.microsoft.com/office/2006/metadata/properties" xmlns:xsi="http://www.w3.org/2001/XMLSchema-instance" xmlns:pc="http://schemas.microsoft.com/office/infopath/2007/PartnerControls">
+  <documentManagement>
+    <_ip_UnifiedCompliancePolicyUIAction xmlns="http://schemas.microsoft.com/sharepoint/v3" xsi:nil="true"/>
+    <Image xmlns="71af3243-3dd4-4a8d-8c0d-dd76da1f02a5">
+      <Url xsi:nil="true"/>
+      <Description xsi:nil="true"/>
+    </Image>
+    <Status xmlns="71af3243-3dd4-4a8d-8c0d-dd76da1f02a5">Not started</Status>
+    <Background xmlns="71af3243-3dd4-4a8d-8c0d-dd76da1f02a5">false</Background>
+    <_ip_UnifiedCompliancePolicyProperties xmlns="http://schemas.microsoft.com/sharepoint/v3" xsi:nil="true"/>
+    <ImageTagsTaxHTField xmlns="71af3243-3dd4-4a8d-8c0d-dd76da1f02a5">
+      <Terms xmlns="http://schemas.microsoft.com/office/infopath/2007/PartnerControls"/>
+    </ImageTagsTaxHTField>
+    <TaxCatchAll xmlns="230e9df3-be65-4c73-a93b-d1236ebd677e" xsi:nil="true"/>
+    <MediaServiceKeyPoints xmlns="71af3243-3dd4-4a8d-8c0d-dd76da1f02a5" xsi:nil="true"/>
+  </documentManagement>
+</p:properties>
+</file>
+
+<file path=customXml/item3.xml><?xml version="1.0" encoding="utf-8"?>
 <ct:contentTypeSchema xmlns:ct="http://schemas.microsoft.com/office/2006/metadata/contentType" xmlns:ma="http://schemas.microsoft.com/office/2006/metadata/properties/metaAttributes" ct:_="" ma:_="" ma:contentTypeName="Document" ma:contentTypeID="0x01010079F111ED35F8CC479449609E8A0923A6" ma:contentTypeVersion="28" ma:contentTypeDescription="Create a new document." ma:contentTypeScope="" ma:versionID="60f5a4f2d2b0abadcf532d48ebf9cb71">
   <xsd:schema xmlns:xsd="http://www.w3.org/2001/XMLSchema" xmlns:xs="http://www.w3.org/2001/XMLSchema" xmlns:p="http://schemas.microsoft.com/office/2006/metadata/properties" xmlns:ns1="http://schemas.microsoft.com/sharepoint/v3" xmlns:ns2="71af3243-3dd4-4a8d-8c0d-dd76da1f02a5" xmlns:ns3="16c05727-aa75-4e4a-9b5f-8a80a1165891" xmlns:ns4="230e9df3-be65-4c73-a93b-d1236ebd677e" targetNamespace="http://schemas.microsoft.com/office/2006/metadata/properties" ma:root="true" ma:fieldsID="7dd78129e6a1811f84807ad11c651531" ns1:_="" ns2:_="" ns3:_="" ns4:_="">
     <xsd:import namespace="http://schemas.microsoft.com/sharepoint/v3"/>
@@ -7403,36 +8094,27 @@
 </ct:contentTypeSchema>
 </file>
 
-<file path=customXml/item2.xml><?xml version="1.0" encoding="utf-8"?>
-<?mso-contentType ?>
-<FormTemplates xmlns="http://schemas.microsoft.com/sharepoint/v3/contenttype/forms">
-  <Display>DocumentLibraryForm</Display>
-  <Edit>DocumentLibraryForm</Edit>
-  <New>DocumentLibraryForm</New>
-</FormTemplates>
+<file path=customXml/itemProps1.xml><?xml version="1.0" encoding="utf-8"?>
+<ds:datastoreItem xmlns:ds="http://schemas.openxmlformats.org/officeDocument/2006/customXml" ds:itemID="{B7B39BD0-040C-43BE-B0E4-512B09E8003F}">
+  <ds:schemaRefs>
+    <ds:schemaRef ds:uri="http://schemas.microsoft.com/sharepoint/v3/contenttype/forms"/>
+  </ds:schemaRefs>
+</ds:datastoreItem>
 </file>
 
-<file path=customXml/item3.xml><?xml version="1.0" encoding="utf-8"?>
-<p:properties xmlns:p="http://schemas.microsoft.com/office/2006/metadata/properties" xmlns:xsi="http://www.w3.org/2001/XMLSchema-instance" xmlns:pc="http://schemas.microsoft.com/office/infopath/2007/PartnerControls">
-  <documentManagement>
-    <_ip_UnifiedCompliancePolicyUIAction xmlns="http://schemas.microsoft.com/sharepoint/v3" xsi:nil="true"/>
-    <Image xmlns="71af3243-3dd4-4a8d-8c0d-dd76da1f02a5">
-      <Url xsi:nil="true"/>
-      <Description xsi:nil="true"/>
-    </Image>
-    <Status xmlns="71af3243-3dd4-4a8d-8c0d-dd76da1f02a5">Not started</Status>
-    <Background xmlns="71af3243-3dd4-4a8d-8c0d-dd76da1f02a5">false</Background>
-    <_ip_UnifiedCompliancePolicyProperties xmlns="http://schemas.microsoft.com/sharepoint/v3" xsi:nil="true"/>
-    <ImageTagsTaxHTField xmlns="71af3243-3dd4-4a8d-8c0d-dd76da1f02a5">
-      <Terms xmlns="http://schemas.microsoft.com/office/infopath/2007/PartnerControls"/>
-    </ImageTagsTaxHTField>
-    <TaxCatchAll xmlns="230e9df3-be65-4c73-a93b-d1236ebd677e" xsi:nil="true"/>
-    <MediaServiceKeyPoints xmlns="71af3243-3dd4-4a8d-8c0d-dd76da1f02a5" xsi:nil="true"/>
-  </documentManagement>
-</p:properties>
+<file path=customXml/itemProps2.xml><?xml version="1.0" encoding="utf-8"?>
+<ds:datastoreItem xmlns:ds="http://schemas.openxmlformats.org/officeDocument/2006/customXml" ds:itemID="{AB045227-5724-4DBF-9712-031B1BFB2C3C}">
+  <ds:schemaRefs>
+    <ds:schemaRef ds:uri="http://schemas.microsoft.com/office/2006/metadata/properties"/>
+    <ds:schemaRef ds:uri="http://schemas.microsoft.com/office/infopath/2007/PartnerControls"/>
+    <ds:schemaRef ds:uri="http://schemas.microsoft.com/sharepoint/v3"/>
+    <ds:schemaRef ds:uri="71af3243-3dd4-4a8d-8c0d-dd76da1f02a5"/>
+    <ds:schemaRef ds:uri="230e9df3-be65-4c73-a93b-d1236ebd677e"/>
+  </ds:schemaRefs>
+</ds:datastoreItem>
 </file>
 
-<file path=customXml/itemProps1.xml><?xml version="1.0" encoding="utf-8"?>
+<file path=customXml/itemProps3.xml><?xml version="1.0" encoding="utf-8"?>
 <ds:datastoreItem xmlns:ds="http://schemas.openxmlformats.org/officeDocument/2006/customXml" ds:itemID="{622457D9-12AC-4794-A05E-F1B90FCD8DA7}">
   <ds:schemaRefs>
     <ds:schemaRef ds:uri="http://schemas.microsoft.com/office/2006/metadata/contentType"/>
@@ -7453,26 +8135,6 @@
 </ds:datastoreItem>
 </file>
 
-<file path=customXml/itemProps2.xml><?xml version="1.0" encoding="utf-8"?>
-<ds:datastoreItem xmlns:ds="http://schemas.openxmlformats.org/officeDocument/2006/customXml" ds:itemID="{B7B39BD0-040C-43BE-B0E4-512B09E8003F}">
-  <ds:schemaRefs>
-    <ds:schemaRef ds:uri="http://schemas.microsoft.com/sharepoint/v3/contenttype/forms"/>
-  </ds:schemaRefs>
-</ds:datastoreItem>
-</file>
-
-<file path=customXml/itemProps3.xml><?xml version="1.0" encoding="utf-8"?>
-<ds:datastoreItem xmlns:ds="http://schemas.openxmlformats.org/officeDocument/2006/customXml" ds:itemID="{AB045227-5724-4DBF-9712-031B1BFB2C3C}">
-  <ds:schemaRefs>
-    <ds:schemaRef ds:uri="http://schemas.microsoft.com/office/2006/metadata/properties"/>
-    <ds:schemaRef ds:uri="http://schemas.microsoft.com/office/infopath/2007/PartnerControls"/>
-    <ds:schemaRef ds:uri="http://schemas.microsoft.com/sharepoint/v3"/>
-    <ds:schemaRef ds:uri="71af3243-3dd4-4a8d-8c0d-dd76da1f02a5"/>
-    <ds:schemaRef ds:uri="230e9df3-be65-4c73-a93b-d1236ebd677e"/>
-  </ds:schemaRefs>
-</ds:datastoreItem>
-</file>
-
 <file path=docMetadata/LabelInfo.xml><?xml version="1.0" encoding="utf-8"?>
 <clbl:labelList xmlns:clbl="http://schemas.microsoft.com/office/2020/mipLabelMetadata"/>
 </file>
</xml_diff>